<commit_message>
Remove Lombiq logo from the PPT
</commit_message>
<xml_diff>
--- a/Orchard Harvest 2023.pptx
+++ b/Orchard Harvest 2023.pptx
@@ -809,7 +809,7 @@
   <p:cSld>
     <p:spTree>
       <p:nvGrpSpPr>
-        <p:cNvPr id="145" name="Shape 145"/>
+        <p:cNvPr id="144" name="Shape 144"/>
         <p:cNvGrpSpPr/>
         <p:nvPr/>
       </p:nvGrpSpPr>
@@ -823,7 +823,7 @@
       </p:grpSpPr>
       <p:sp>
         <p:nvSpPr>
-          <p:cNvPr id="146" name="Google Shape;146;g242cf0fc797_0_49:notes"/>
+          <p:cNvPr id="145" name="Google Shape;145;g242cf0fc797_0_49:notes"/>
           <p:cNvSpPr/>
           <p:nvPr>
             <p:ph idx="2" type="sldImg"/>
@@ -858,7 +858,7 @@
       </p:sp>
       <p:sp>
         <p:nvSpPr>
-          <p:cNvPr id="147" name="Google Shape;147;g242cf0fc797_0_49:notes"/>
+          <p:cNvPr id="146" name="Google Shape;146;g242cf0fc797_0_49:notes"/>
           <p:cNvSpPr txBox="1"/>
           <p:nvPr>
             <p:ph idx="1" type="body"/>
@@ -908,7 +908,7 @@
   <p:cSld>
     <p:spTree>
       <p:nvGrpSpPr>
-        <p:cNvPr id="158" name="Shape 158"/>
+        <p:cNvPr id="157" name="Shape 157"/>
         <p:cNvGrpSpPr/>
         <p:nvPr/>
       </p:nvGrpSpPr>
@@ -922,7 +922,7 @@
       </p:grpSpPr>
       <p:sp>
         <p:nvSpPr>
-          <p:cNvPr id="159" name="Google Shape;159;g242cf0fc797_1_18:notes"/>
+          <p:cNvPr id="158" name="Google Shape;158;g242cf0fc797_1_18:notes"/>
           <p:cNvSpPr/>
           <p:nvPr>
             <p:ph idx="2" type="sldImg"/>
@@ -957,7 +957,7 @@
       </p:sp>
       <p:sp>
         <p:nvSpPr>
-          <p:cNvPr id="160" name="Google Shape;160;g242cf0fc797_1_18:notes"/>
+          <p:cNvPr id="159" name="Google Shape;159;g242cf0fc797_1_18:notes"/>
           <p:cNvSpPr txBox="1"/>
           <p:nvPr>
             <p:ph idx="1" type="body"/>
@@ -1007,7 +1007,7 @@
   <p:cSld>
     <p:spTree>
       <p:nvGrpSpPr>
-        <p:cNvPr id="171" name="Shape 171"/>
+        <p:cNvPr id="170" name="Shape 170"/>
         <p:cNvGrpSpPr/>
         <p:nvPr/>
       </p:nvGrpSpPr>
@@ -1021,7 +1021,7 @@
       </p:grpSpPr>
       <p:sp>
         <p:nvSpPr>
-          <p:cNvPr id="172" name="Google Shape;172;g242cf0fc797_2_1:notes"/>
+          <p:cNvPr id="171" name="Google Shape;171;g242cf0fc797_2_1:notes"/>
           <p:cNvSpPr/>
           <p:nvPr>
             <p:ph idx="2" type="sldImg"/>
@@ -1056,7 +1056,7 @@
       </p:sp>
       <p:sp>
         <p:nvSpPr>
-          <p:cNvPr id="173" name="Google Shape;173;g242cf0fc797_2_1:notes"/>
+          <p:cNvPr id="172" name="Google Shape;172;g242cf0fc797_2_1:notes"/>
           <p:cNvSpPr txBox="1"/>
           <p:nvPr>
             <p:ph idx="1" type="body"/>
@@ -9678,37 +9678,9 @@
           </a:ln>
         </p:spPr>
       </p:pic>
-      <p:pic>
-        <p:nvPicPr>
-          <p:cNvPr id="143" name="Google Shape;143;p13"/>
-          <p:cNvPicPr preferRelativeResize="0"/>
-          <p:nvPr/>
-        </p:nvPicPr>
-        <p:blipFill>
-          <a:blip r:embed="rId5">
-            <a:alphaModFix/>
-          </a:blip>
-          <a:stretch>
-            <a:fillRect/>
-          </a:stretch>
-        </p:blipFill>
-        <p:spPr>
-          <a:xfrm>
-            <a:off x="125975" y="4360475"/>
-            <a:ext cx="683326" cy="726899"/>
-          </a:xfrm>
-          <a:prstGeom prst="rect">
-            <a:avLst/>
-          </a:prstGeom>
-          <a:noFill/>
-          <a:ln>
-            <a:noFill/>
-          </a:ln>
-        </p:spPr>
-      </p:pic>
       <p:sp>
         <p:nvSpPr>
-          <p:cNvPr id="144" name="Google Shape;144;p13"/>
+          <p:cNvPr id="143" name="Google Shape;143;p13"/>
           <p:cNvSpPr txBox="1"/>
           <p:nvPr>
             <p:ph type="ctrTitle"/>
@@ -9717,7 +9689,7 @@
         <p:spPr>
           <a:xfrm>
             <a:off x="3537150" y="124200"/>
-            <a:ext cx="5417100" cy="1578900"/>
+            <a:ext cx="5520300" cy="1578900"/>
           </a:xfrm>
           <a:prstGeom prst="rect">
             <a:avLst/>
@@ -9777,7 +9749,7 @@
   <p:cSld>
     <p:spTree>
       <p:nvGrpSpPr>
-        <p:cNvPr id="148" name="Shape 148"/>
+        <p:cNvPr id="147" name="Shape 147"/>
         <p:cNvGrpSpPr/>
         <p:nvPr/>
       </p:nvGrpSpPr>
@@ -9791,7 +9763,7 @@
       </p:grpSpPr>
       <p:sp>
         <p:nvSpPr>
-          <p:cNvPr id="149" name="Google Shape;149;p14"/>
+          <p:cNvPr id="148" name="Google Shape;148;p14"/>
           <p:cNvSpPr txBox="1"/>
           <p:nvPr>
             <p:ph type="title"/>
@@ -9835,7 +9807,7 @@
       </p:sp>
       <p:sp>
         <p:nvSpPr>
-          <p:cNvPr id="150" name="Google Shape;150;p14"/>
+          <p:cNvPr id="149" name="Google Shape;149;p14"/>
           <p:cNvSpPr txBox="1"/>
           <p:nvPr>
             <p:ph idx="1" type="body"/>
@@ -9989,7 +9961,7 @@
                   <a:schemeClr val="dk1"/>
                 </a:solidFill>
               </a:rPr>
-              <a:t>Git Hub:</a:t>
+              <a:t>GitHub:</a:t>
             </a:r>
             <a:r>
               <a:rPr lang="en">
@@ -10041,7 +10013,7 @@
       </p:sp>
       <p:grpSp>
         <p:nvGrpSpPr>
-          <p:cNvPr id="151" name="Google Shape;151;p14"/>
+          <p:cNvPr id="150" name="Google Shape;150;p14"/>
           <p:cNvGrpSpPr/>
           <p:nvPr/>
         </p:nvGrpSpPr>
@@ -10055,7 +10027,7 @@
         </p:grpSpPr>
         <p:sp>
           <p:nvSpPr>
-            <p:cNvPr id="152" name="Google Shape;152;p14"/>
+            <p:cNvPr id="151" name="Google Shape;151;p14"/>
             <p:cNvSpPr/>
             <p:nvPr/>
           </p:nvSpPr>
@@ -10100,7 +10072,7 @@
         </p:sp>
         <p:sp>
           <p:nvSpPr>
-            <p:cNvPr id="153" name="Google Shape;153;p14"/>
+            <p:cNvPr id="152" name="Google Shape;152;p14"/>
             <p:cNvSpPr txBox="1"/>
             <p:nvPr/>
           </p:nvSpPr>
@@ -10158,7 +10130,7 @@
         </p:sp>
         <p:grpSp>
           <p:nvGrpSpPr>
-            <p:cNvPr id="154" name="Google Shape;154;p14"/>
+            <p:cNvPr id="153" name="Google Shape;153;p14"/>
             <p:cNvGrpSpPr/>
             <p:nvPr/>
           </p:nvGrpSpPr>
@@ -10172,7 +10144,7 @@
           </p:grpSpPr>
           <p:sp>
             <p:nvSpPr>
-              <p:cNvPr id="155" name="Google Shape;155;p14"/>
+              <p:cNvPr id="154" name="Google Shape;154;p14"/>
               <p:cNvSpPr/>
               <p:nvPr/>
             </p:nvSpPr>
@@ -10215,7 +10187,7 @@
           </p:sp>
           <p:pic>
             <p:nvPicPr>
-              <p:cNvPr id="156" name="Google Shape;156;p14"/>
+              <p:cNvPr id="155" name="Google Shape;155;p14"/>
               <p:cNvPicPr preferRelativeResize="0"/>
               <p:nvPr/>
             </p:nvPicPr>
@@ -10245,7 +10217,7 @@
       </p:grpSp>
       <p:sp>
         <p:nvSpPr>
-          <p:cNvPr id="157" name="Google Shape;157;p14"/>
+          <p:cNvPr id="156" name="Google Shape;156;p14"/>
           <p:cNvSpPr txBox="1"/>
           <p:nvPr>
             <p:ph idx="4294967295" type="ctrTitle"/>
@@ -10254,7 +10226,7 @@
         <p:spPr>
           <a:xfrm>
             <a:off x="3537150" y="124200"/>
-            <a:ext cx="5417100" cy="1608300"/>
+            <a:ext cx="5520300" cy="1578900"/>
           </a:xfrm>
           <a:prstGeom prst="rect">
             <a:avLst/>
@@ -10278,11 +10250,7 @@
               <a:buNone/>
             </a:pPr>
             <a:r>
-              <a:rPr b="1" lang="en" sz="2600">
-                <a:solidFill>
-                  <a:srgbClr val="41B670"/>
-                </a:solidFill>
-              </a:rPr>
+              <a:rPr b="1" lang="en" sz="2600"/>
               <a:t>ORCHARD HARVEST</a:t>
             </a:r>
             <a:r>
@@ -10318,7 +10286,7 @@
   <p:cSld>
     <p:spTree>
       <p:nvGrpSpPr>
-        <p:cNvPr id="161" name="Shape 161"/>
+        <p:cNvPr id="160" name="Shape 160"/>
         <p:cNvGrpSpPr/>
         <p:nvPr/>
       </p:nvGrpSpPr>
@@ -10332,7 +10300,7 @@
       </p:grpSpPr>
       <p:sp>
         <p:nvSpPr>
-          <p:cNvPr id="162" name="Google Shape;162;p15"/>
+          <p:cNvPr id="161" name="Google Shape;161;p15"/>
           <p:cNvSpPr txBox="1"/>
           <p:nvPr>
             <p:ph type="title"/>
@@ -10376,7 +10344,7 @@
       </p:sp>
       <p:sp>
         <p:nvSpPr>
-          <p:cNvPr id="163" name="Google Shape;163;p15"/>
+          <p:cNvPr id="162" name="Google Shape;162;p15"/>
           <p:cNvSpPr txBox="1"/>
           <p:nvPr>
             <p:ph idx="1" type="body"/>
@@ -10509,7 +10477,7 @@
       </p:sp>
       <p:grpSp>
         <p:nvGrpSpPr>
-          <p:cNvPr id="164" name="Google Shape;164;p15"/>
+          <p:cNvPr id="163" name="Google Shape;163;p15"/>
           <p:cNvGrpSpPr/>
           <p:nvPr/>
         </p:nvGrpSpPr>
@@ -10523,7 +10491,7 @@
         </p:grpSpPr>
         <p:sp>
           <p:nvSpPr>
-            <p:cNvPr id="165" name="Google Shape;165;p15"/>
+            <p:cNvPr id="164" name="Google Shape;164;p15"/>
             <p:cNvSpPr/>
             <p:nvPr/>
           </p:nvSpPr>
@@ -10568,7 +10536,7 @@
         </p:sp>
         <p:sp>
           <p:nvSpPr>
-            <p:cNvPr id="166" name="Google Shape;166;p15"/>
+            <p:cNvPr id="165" name="Google Shape;165;p15"/>
             <p:cNvSpPr txBox="1"/>
             <p:nvPr/>
           </p:nvSpPr>
@@ -10626,7 +10594,7 @@
         </p:sp>
         <p:grpSp>
           <p:nvGrpSpPr>
-            <p:cNvPr id="167" name="Google Shape;167;p15"/>
+            <p:cNvPr id="166" name="Google Shape;166;p15"/>
             <p:cNvGrpSpPr/>
             <p:nvPr/>
           </p:nvGrpSpPr>
@@ -10640,7 +10608,7 @@
           </p:grpSpPr>
           <p:sp>
             <p:nvSpPr>
-              <p:cNvPr id="168" name="Google Shape;168;p15"/>
+              <p:cNvPr id="167" name="Google Shape;167;p15"/>
               <p:cNvSpPr/>
               <p:nvPr/>
             </p:nvSpPr>
@@ -10683,7 +10651,7 @@
           </p:sp>
           <p:pic>
             <p:nvPicPr>
-              <p:cNvPr id="169" name="Google Shape;169;p15"/>
+              <p:cNvPr id="168" name="Google Shape;168;p15"/>
               <p:cNvPicPr preferRelativeResize="0"/>
               <p:nvPr/>
             </p:nvPicPr>
@@ -10713,7 +10681,7 @@
       </p:grpSp>
       <p:sp>
         <p:nvSpPr>
-          <p:cNvPr id="170" name="Google Shape;170;p15"/>
+          <p:cNvPr id="169" name="Google Shape;169;p15"/>
           <p:cNvSpPr txBox="1"/>
           <p:nvPr>
             <p:ph idx="4294967295" type="ctrTitle"/>
@@ -10722,7 +10690,7 @@
         <p:spPr>
           <a:xfrm>
             <a:off x="3537150" y="124200"/>
-            <a:ext cx="5417100" cy="1578900"/>
+            <a:ext cx="5520300" cy="1578900"/>
           </a:xfrm>
           <a:prstGeom prst="rect">
             <a:avLst/>
@@ -10746,11 +10714,7 @@
               <a:buNone/>
             </a:pPr>
             <a:r>
-              <a:rPr b="1" lang="en" sz="2600">
-                <a:solidFill>
-                  <a:srgbClr val="41B670"/>
-                </a:solidFill>
-              </a:rPr>
+              <a:rPr b="1" lang="en" sz="2600"/>
               <a:t>ORCHARD HARVEST</a:t>
             </a:r>
             <a:r>
@@ -10786,7 +10750,7 @@
   <p:cSld>
     <p:spTree>
       <p:nvGrpSpPr>
-        <p:cNvPr id="174" name="Shape 174"/>
+        <p:cNvPr id="173" name="Shape 173"/>
         <p:cNvGrpSpPr/>
         <p:nvPr/>
       </p:nvGrpSpPr>
@@ -10800,7 +10764,7 @@
       </p:grpSpPr>
       <p:sp>
         <p:nvSpPr>
-          <p:cNvPr id="175" name="Google Shape;175;p16"/>
+          <p:cNvPr id="174" name="Google Shape;174;p16"/>
           <p:cNvSpPr txBox="1"/>
           <p:nvPr>
             <p:ph type="title"/>
@@ -10844,7 +10808,7 @@
       </p:sp>
       <p:sp>
         <p:nvSpPr>
-          <p:cNvPr id="176" name="Google Shape;176;p16"/>
+          <p:cNvPr id="175" name="Google Shape;175;p16"/>
           <p:cNvSpPr txBox="1"/>
           <p:nvPr>
             <p:ph idx="1" type="body"/>
@@ -10892,7 +10856,7 @@
       </p:sp>
       <p:grpSp>
         <p:nvGrpSpPr>
-          <p:cNvPr id="177" name="Google Shape;177;p16"/>
+          <p:cNvPr id="176" name="Google Shape;176;p16"/>
           <p:cNvGrpSpPr/>
           <p:nvPr/>
         </p:nvGrpSpPr>
@@ -10906,7 +10870,7 @@
         </p:grpSpPr>
         <p:sp>
           <p:nvSpPr>
-            <p:cNvPr id="178" name="Google Shape;178;p16"/>
+            <p:cNvPr id="177" name="Google Shape;177;p16"/>
             <p:cNvSpPr/>
             <p:nvPr/>
           </p:nvSpPr>
@@ -10951,7 +10915,7 @@
         </p:sp>
         <p:sp>
           <p:nvSpPr>
-            <p:cNvPr id="179" name="Google Shape;179;p16"/>
+            <p:cNvPr id="178" name="Google Shape;178;p16"/>
             <p:cNvSpPr txBox="1"/>
             <p:nvPr/>
           </p:nvSpPr>
@@ -11009,7 +10973,7 @@
         </p:sp>
         <p:grpSp>
           <p:nvGrpSpPr>
-            <p:cNvPr id="180" name="Google Shape;180;p16"/>
+            <p:cNvPr id="179" name="Google Shape;179;p16"/>
             <p:cNvGrpSpPr/>
             <p:nvPr/>
           </p:nvGrpSpPr>
@@ -11023,7 +10987,7 @@
           </p:grpSpPr>
           <p:sp>
             <p:nvSpPr>
-              <p:cNvPr id="181" name="Google Shape;181;p16"/>
+              <p:cNvPr id="180" name="Google Shape;180;p16"/>
               <p:cNvSpPr/>
               <p:nvPr/>
             </p:nvSpPr>
@@ -11066,7 +11030,7 @@
           </p:sp>
           <p:pic>
             <p:nvPicPr>
-              <p:cNvPr id="182" name="Google Shape;182;p16"/>
+              <p:cNvPr id="181" name="Google Shape;181;p16"/>
               <p:cNvPicPr preferRelativeResize="0"/>
               <p:nvPr/>
             </p:nvPicPr>
@@ -11096,7 +11060,7 @@
       </p:grpSp>
       <p:sp>
         <p:nvSpPr>
-          <p:cNvPr id="183" name="Google Shape;183;p16"/>
+          <p:cNvPr id="182" name="Google Shape;182;p16"/>
           <p:cNvSpPr txBox="1"/>
           <p:nvPr>
             <p:ph idx="4294967295" type="ctrTitle"/>
@@ -11105,7 +11069,7 @@
         <p:spPr>
           <a:xfrm>
             <a:off x="3537150" y="124200"/>
-            <a:ext cx="5417100" cy="1578900"/>
+            <a:ext cx="5520300" cy="1578900"/>
           </a:xfrm>
           <a:prstGeom prst="rect">
             <a:avLst/>
@@ -11129,11 +11093,7 @@
               <a:buNone/>
             </a:pPr>
             <a:r>
-              <a:rPr b="1" lang="en" sz="2600">
-                <a:solidFill>
-                  <a:srgbClr val="41B670"/>
-                </a:solidFill>
-              </a:rPr>
+              <a:rPr b="1" lang="en" sz="2600"/>
               <a:t>ORCHARD HARVEST</a:t>
             </a:r>
             <a:r>

</xml_diff>